<commit_message>
- Presentations are updated
</commit_message>
<xml_diff>
--- a/resource/document/MetaOutput - Extensions.pptx
+++ b/resource/document/MetaOutput - Extensions.pptx
@@ -214,7 +214,7 @@
           <a:p>
             <a:fld id="{AEB24F57-5CEA-4234-9EE0-A10FCC34EE54}" type="datetimeFigureOut">
               <a:rPr lang="en-US" smtClean="0"/>
-              <a:t>7/22/2021</a:t>
+              <a:t>7/24/2021</a:t>
             </a:fld>
             <a:endParaRPr lang="en-US"/>
           </a:p>
@@ -764,7 +764,7 @@
             </a:pPr>
             <a:r>
               <a:rPr lang="en-US" sz="1200" dirty="0"/>
-              <a:t>These functionality implemented as standard extensions for concrete IDE and can be installed by standard distribution mechanism.</a:t>
+              <a:t>These functionality is implemented as standard extension for specific IDE and can be installed by standard distribution mechanism.</a:t>
             </a:r>
             <a:r>
               <a:rPr lang="en-US" dirty="0"/>
@@ -1092,7 +1092,7 @@
             </a:pPr>
             <a:r>
               <a:rPr lang="en-US" sz="1200" dirty="0"/>
-              <a:t>It is possible to make directly from </a:t>
+              <a:t>It is possible to install directly from </a:t>
             </a:r>
             <a:r>
               <a:rPr lang="en-US" sz="1200" b="1" dirty="0">
@@ -1499,7 +1499,7 @@
           <a:p>
             <a:fld id="{0043A13F-D5E6-4491-83CF-85EBA9699740}" type="datetimeFigureOut">
               <a:rPr lang="ru-UA" smtClean="0"/>
-              <a:t>07/22/2021</a:t>
+              <a:t>07/24/2021</a:t>
             </a:fld>
             <a:endParaRPr lang="ru-UA" dirty="0"/>
           </a:p>
@@ -1756,7 +1756,7 @@
           <a:p>
             <a:fld id="{0043A13F-D5E6-4491-83CF-85EBA9699740}" type="datetimeFigureOut">
               <a:rPr lang="ru-UA" smtClean="0"/>
-              <a:t>07/22/2021</a:t>
+              <a:t>07/24/2021</a:t>
             </a:fld>
             <a:endParaRPr lang="ru-UA"/>
           </a:p>
@@ -1926,7 +1926,7 @@
           <a:p>
             <a:fld id="{0043A13F-D5E6-4491-83CF-85EBA9699740}" type="datetimeFigureOut">
               <a:rPr lang="ru-UA" smtClean="0"/>
-              <a:t>07/22/2021</a:t>
+              <a:t>07/24/2021</a:t>
             </a:fld>
             <a:endParaRPr lang="ru-UA"/>
           </a:p>
@@ -2106,7 +2106,7 @@
           <a:p>
             <a:fld id="{0043A13F-D5E6-4491-83CF-85EBA9699740}" type="datetimeFigureOut">
               <a:rPr lang="ru-UA" smtClean="0"/>
-              <a:t>07/22/2021</a:t>
+              <a:t>07/24/2021</a:t>
             </a:fld>
             <a:endParaRPr lang="ru-UA"/>
           </a:p>
@@ -2407,7 +2407,7 @@
           <a:p>
             <a:fld id="{0043A13F-D5E6-4491-83CF-85EBA9699740}" type="datetimeFigureOut">
               <a:rPr lang="ru-UA" smtClean="0"/>
-              <a:t>07/22/2021</a:t>
+              <a:t>07/24/2021</a:t>
             </a:fld>
             <a:endParaRPr lang="ru-UA"/>
           </a:p>
@@ -2922,7 +2922,7 @@
           <a:p>
             <a:fld id="{0043A13F-D5E6-4491-83CF-85EBA9699740}" type="datetimeFigureOut">
               <a:rPr lang="ru-UA" smtClean="0"/>
-              <a:t>07/22/2021</a:t>
+              <a:t>07/24/2021</a:t>
             </a:fld>
             <a:endParaRPr lang="ru-UA"/>
           </a:p>
@@ -3168,7 +3168,7 @@
           <a:p>
             <a:fld id="{0043A13F-D5E6-4491-83CF-85EBA9699740}" type="datetimeFigureOut">
               <a:rPr lang="ru-UA" smtClean="0"/>
-              <a:t>07/22/2021</a:t>
+              <a:t>07/24/2021</a:t>
             </a:fld>
             <a:endParaRPr lang="ru-UA"/>
           </a:p>
@@ -3456,7 +3456,7 @@
           <a:p>
             <a:fld id="{0043A13F-D5E6-4491-83CF-85EBA9699740}" type="datetimeFigureOut">
               <a:rPr lang="ru-UA" smtClean="0"/>
-              <a:t>07/22/2021</a:t>
+              <a:t>07/24/2021</a:t>
             </a:fld>
             <a:endParaRPr lang="ru-UA"/>
           </a:p>
@@ -3944,7 +3944,7 @@
           <a:p>
             <a:fld id="{0043A13F-D5E6-4491-83CF-85EBA9699740}" type="datetimeFigureOut">
               <a:rPr lang="ru-UA" smtClean="0"/>
-              <a:t>07/22/2021</a:t>
+              <a:t>07/24/2021</a:t>
             </a:fld>
             <a:endParaRPr lang="ru-UA"/>
           </a:p>
@@ -4062,7 +4062,7 @@
           <a:p>
             <a:fld id="{0043A13F-D5E6-4491-83CF-85EBA9699740}" type="datetimeFigureOut">
               <a:rPr lang="ru-UA" smtClean="0"/>
-              <a:t>07/22/2021</a:t>
+              <a:t>07/24/2021</a:t>
             </a:fld>
             <a:endParaRPr lang="ru-UA"/>
           </a:p>
@@ -4157,7 +4157,7 @@
           <a:p>
             <a:fld id="{0043A13F-D5E6-4491-83CF-85EBA9699740}" type="datetimeFigureOut">
               <a:rPr lang="ru-UA" smtClean="0"/>
-              <a:t>07/22/2021</a:t>
+              <a:t>07/24/2021</a:t>
             </a:fld>
             <a:endParaRPr lang="ru-UA"/>
           </a:p>
@@ -4434,7 +4434,7 @@
           <a:p>
             <a:fld id="{0043A13F-D5E6-4491-83CF-85EBA9699740}" type="datetimeFigureOut">
               <a:rPr lang="ru-UA" smtClean="0"/>
-              <a:t>07/22/2021</a:t>
+              <a:t>07/24/2021</a:t>
             </a:fld>
             <a:endParaRPr lang="ru-UA"/>
           </a:p>
@@ -4656,7 +4656,7 @@
           <a:p>
             <a:fld id="{0043A13F-D5E6-4491-83CF-85EBA9699740}" type="datetimeFigureOut">
               <a:rPr lang="ru-UA" smtClean="0"/>
-              <a:t>07/22/2021</a:t>
+              <a:t>07/24/2021</a:t>
             </a:fld>
             <a:endParaRPr lang="ru-UA"/>
           </a:p>
@@ -5549,7 +5549,7 @@
             </a:pPr>
             <a:r>
               <a:rPr lang="en-US" sz="2400" dirty="0"/>
-              <a:t>These functionality implemented as standard extensions for concrete IDE and can be installed by standard distribution mechanism.</a:t>
+              <a:t>These functionality is implemented as standard extension for specific IDE and can be installed by standard distribution mechanism.</a:t>
             </a:r>
           </a:p>
           <a:p>
@@ -5595,11 +5595,11 @@
       </p:sp>
       <p:pic>
         <p:nvPicPr>
-          <p:cNvPr id="5" name="ttsMP3.com_VoiceText_2021-7-23_0_10_9">
+          <p:cNvPr id="4" name="ttsMP3.com_VoiceText_2021-7-24_19_36_39">
             <a:hlinkClick r:id="" action="ppaction://media"/>
             <a:extLst>
               <a:ext uri="{FF2B5EF4-FFF2-40B4-BE49-F238E27FC236}">
-                <a16:creationId xmlns:a16="http://schemas.microsoft.com/office/drawing/2014/main" id="{BA095E5E-6FB0-432E-8E0A-3AF931877784}"/>
+                <a16:creationId xmlns:a16="http://schemas.microsoft.com/office/drawing/2014/main" id="{12BA4C2E-C01E-4D48-8000-D3A559185C55}"/>
               </a:ext>
             </a:extLst>
           </p:cNvPr>
@@ -5684,9 +5684,9 @@
                                   <p:childTnLst>
                                     <p:cmd type="call" cmd="playFrom(0.0)">
                                       <p:cBhvr>
-                                        <p:cTn id="6" dur="21002" fill="hold"/>
+                                        <p:cTn id="6" dur="21028" fill="hold"/>
                                         <p:tgtEl>
-                                          <p:spTgt spid="5"/>
+                                          <p:spTgt spid="4"/>
                                         </p:tgtEl>
                                       </p:cBhvr>
                                     </p:cmd>
@@ -5731,7 +5731,7 @@
                   </p:endCondLst>
                 </p:cTn>
                 <p:tgtEl>
-                  <p:spTgt spid="5"/>
+                  <p:spTgt spid="4"/>
                 </p:tgtEl>
               </p:cMediaNode>
             </p:audio>
@@ -8616,7 +8616,7 @@
             </a:pPr>
             <a:r>
               <a:rPr lang="en-US" sz="2400" dirty="0"/>
-              <a:t>It is possible to make directly from </a:t>
+              <a:t>It is possible to install directly from </a:t>
             </a:r>
             <a:r>
               <a:rPr lang="en-US" sz="2400" b="1" dirty="0">
@@ -8670,11 +8670,11 @@
       </p:pic>
       <p:pic>
         <p:nvPicPr>
-          <p:cNvPr id="5" name="ttsMP3.com_VoiceText_2021-7-22_22_46_40">
+          <p:cNvPr id="4" name="ttsMP3.com_VoiceText_2021-7-24_19_37_41">
             <a:hlinkClick r:id="" action="ppaction://media"/>
             <a:extLst>
               <a:ext uri="{FF2B5EF4-FFF2-40B4-BE49-F238E27FC236}">
-                <a16:creationId xmlns:a16="http://schemas.microsoft.com/office/drawing/2014/main" id="{86F71BBB-0A2B-4AC4-8AB6-7ABC59BFCFF2}"/>
+                <a16:creationId xmlns:a16="http://schemas.microsoft.com/office/drawing/2014/main" id="{6C5BA7AF-8138-496B-BC96-6A53B2BD6824}"/>
               </a:ext>
             </a:extLst>
           </p:cNvPr>
@@ -8759,9 +8759,9 @@
                                   <p:childTnLst>
                                     <p:cmd type="call" cmd="playFrom(0.0)">
                                       <p:cBhvr>
-                                        <p:cTn id="6" dur="6060" fill="hold"/>
+                                        <p:cTn id="6" dur="6295" fill="hold"/>
                                         <p:tgtEl>
-                                          <p:spTgt spid="5"/>
+                                          <p:spTgt spid="4"/>
                                         </p:tgtEl>
                                       </p:cBhvr>
                                     </p:cmd>
@@ -8806,7 +8806,7 @@
                   </p:endCondLst>
                 </p:cTn>
                 <p:tgtEl>
-                  <p:spTgt spid="5"/>
+                  <p:spTgt spid="4"/>
                 </p:tgtEl>
               </p:cMediaNode>
             </p:audio>

</xml_diff>